<commit_message>
Added Hadley Centre moving average example
</commit_message>
<xml_diff>
--- a/ppt/lecture4_viz.pptx
+++ b/ppt/lecture4_viz.pptx
@@ -203,7 +203,7 @@
           <a:p>
             <a:fld id="{5132FF9B-2B26-774D-BBDA-BF22A00C632B}" type="datetimeFigureOut">
               <a:rPr lang="en-US" smtClean="0"/>
-              <a:t>10/27/21</a:t>
+              <a:t>10/28/21</a:t>
             </a:fld>
             <a:endParaRPr lang="en-US"/>
           </a:p>
@@ -686,7 +686,7 @@
           <a:p>
             <a:fld id="{EC2496D2-B0A7-A645-81FE-0B4BDE8D0ABC}" type="datetimeFigureOut">
               <a:rPr lang="en-US" smtClean="0"/>
-              <a:t>10/27/21</a:t>
+              <a:t>10/28/21</a:t>
             </a:fld>
             <a:endParaRPr lang="en-US"/>
           </a:p>
@@ -856,7 +856,7 @@
           <a:p>
             <a:fld id="{EC2496D2-B0A7-A645-81FE-0B4BDE8D0ABC}" type="datetimeFigureOut">
               <a:rPr lang="en-US" smtClean="0"/>
-              <a:t>10/27/21</a:t>
+              <a:t>10/28/21</a:t>
             </a:fld>
             <a:endParaRPr lang="en-US"/>
           </a:p>
@@ -1036,7 +1036,7 @@
           <a:p>
             <a:fld id="{EC2496D2-B0A7-A645-81FE-0B4BDE8D0ABC}" type="datetimeFigureOut">
               <a:rPr lang="en-US" smtClean="0"/>
-              <a:t>10/27/21</a:t>
+              <a:t>10/28/21</a:t>
             </a:fld>
             <a:endParaRPr lang="en-US"/>
           </a:p>
@@ -1206,7 +1206,7 @@
           <a:p>
             <a:fld id="{EC2496D2-B0A7-A645-81FE-0B4BDE8D0ABC}" type="datetimeFigureOut">
               <a:rPr lang="en-US" smtClean="0"/>
-              <a:t>10/27/21</a:t>
+              <a:t>10/28/21</a:t>
             </a:fld>
             <a:endParaRPr lang="en-US"/>
           </a:p>
@@ -1452,7 +1452,7 @@
           <a:p>
             <a:fld id="{EC2496D2-B0A7-A645-81FE-0B4BDE8D0ABC}" type="datetimeFigureOut">
               <a:rPr lang="en-US" smtClean="0"/>
-              <a:t>10/27/21</a:t>
+              <a:t>10/28/21</a:t>
             </a:fld>
             <a:endParaRPr lang="en-US"/>
           </a:p>
@@ -1684,7 +1684,7 @@
           <a:p>
             <a:fld id="{EC2496D2-B0A7-A645-81FE-0B4BDE8D0ABC}" type="datetimeFigureOut">
               <a:rPr lang="en-US" smtClean="0"/>
-              <a:t>10/27/21</a:t>
+              <a:t>10/28/21</a:t>
             </a:fld>
             <a:endParaRPr lang="en-US"/>
           </a:p>
@@ -2051,7 +2051,7 @@
           <a:p>
             <a:fld id="{EC2496D2-B0A7-A645-81FE-0B4BDE8D0ABC}" type="datetimeFigureOut">
               <a:rPr lang="en-US" smtClean="0"/>
-              <a:t>10/27/21</a:t>
+              <a:t>10/28/21</a:t>
             </a:fld>
             <a:endParaRPr lang="en-US"/>
           </a:p>
@@ -2169,7 +2169,7 @@
           <a:p>
             <a:fld id="{EC2496D2-B0A7-A645-81FE-0B4BDE8D0ABC}" type="datetimeFigureOut">
               <a:rPr lang="en-US" smtClean="0"/>
-              <a:t>10/27/21</a:t>
+              <a:t>10/28/21</a:t>
             </a:fld>
             <a:endParaRPr lang="en-US"/>
           </a:p>
@@ -2264,7 +2264,7 @@
           <a:p>
             <a:fld id="{EC2496D2-B0A7-A645-81FE-0B4BDE8D0ABC}" type="datetimeFigureOut">
               <a:rPr lang="en-US" smtClean="0"/>
-              <a:t>10/27/21</a:t>
+              <a:t>10/28/21</a:t>
             </a:fld>
             <a:endParaRPr lang="en-US"/>
           </a:p>
@@ -2541,7 +2541,7 @@
           <a:p>
             <a:fld id="{EC2496D2-B0A7-A645-81FE-0B4BDE8D0ABC}" type="datetimeFigureOut">
               <a:rPr lang="en-US" smtClean="0"/>
-              <a:t>10/27/21</a:t>
+              <a:t>10/28/21</a:t>
             </a:fld>
             <a:endParaRPr lang="en-US"/>
           </a:p>
@@ -2794,7 +2794,7 @@
           <a:p>
             <a:fld id="{EC2496D2-B0A7-A645-81FE-0B4BDE8D0ABC}" type="datetimeFigureOut">
               <a:rPr lang="en-US" smtClean="0"/>
-              <a:t>10/27/21</a:t>
+              <a:t>10/28/21</a:t>
             </a:fld>
             <a:endParaRPr lang="en-US"/>
           </a:p>
@@ -3007,7 +3007,7 @@
           <a:p>
             <a:fld id="{EC2496D2-B0A7-A645-81FE-0B4BDE8D0ABC}" type="datetimeFigureOut">
               <a:rPr lang="en-US" smtClean="0"/>
-              <a:t>10/27/21</a:t>
+              <a:t>10/28/21</a:t>
             </a:fld>
             <a:endParaRPr lang="en-US"/>
           </a:p>
@@ -3433,10 +3433,6 @@
               <a:rPr lang="en-US" dirty="0" smtClean="0"/>
               <a:t>BENV0091</a:t>
             </a:r>
-            <a:r>
-              <a:rPr lang="en-US" dirty="0" smtClean="0"/>
-              <a:t/>
-            </a:r>
             <a:br>
               <a:rPr lang="en-US" dirty="0" smtClean="0"/>
             </a:br>
@@ -3446,11 +3442,7 @@
             </a:r>
             <a:r>
               <a:rPr lang="en-US" dirty="0" smtClean="0"/>
-              <a:t> </a:t>
-            </a:r>
-            <a:r>
-              <a:rPr lang="en-US" dirty="0" smtClean="0"/>
-              <a:t>Competition Results</a:t>
+              <a:t> Competition Results</a:t>
             </a:r>
             <a:endParaRPr lang="en-US" dirty="0"/>
           </a:p>
@@ -4156,38 +4148,30 @@
             </a:r>
             <a:r>
               <a:rPr lang="en-US" dirty="0" smtClean="0"/>
-              <a:t> Competition: General </a:t>
-            </a:r>
+              <a:t> Competition: General Feedback</a:t>
+            </a:r>
+            <a:endParaRPr lang="en-US" dirty="0"/>
+          </a:p>
+        </p:txBody>
+      </p:sp>
+      <p:sp>
+        <p:nvSpPr>
+          <p:cNvPr id="3" name="Content Placeholder 2"/>
+          <p:cNvSpPr>
+            <a:spLocks noGrp="1"/>
+          </p:cNvSpPr>
+          <p:nvPr>
+            <p:ph idx="1"/>
+          </p:nvPr>
+        </p:nvSpPr>
+        <p:spPr/>
+        <p:txBody>
+          <a:bodyPr/>
+          <a:lstStyle/>
+          <a:p>
             <a:r>
               <a:rPr lang="en-US" dirty="0" smtClean="0"/>
-              <a:t>Feedback</a:t>
-            </a:r>
-            <a:endParaRPr lang="en-US" dirty="0"/>
-          </a:p>
-        </p:txBody>
-      </p:sp>
-      <p:sp>
-        <p:nvSpPr>
-          <p:cNvPr id="3" name="Content Placeholder 2"/>
-          <p:cNvSpPr>
-            <a:spLocks noGrp="1"/>
-          </p:cNvSpPr>
-          <p:nvPr>
-            <p:ph idx="1"/>
-          </p:nvPr>
-        </p:nvSpPr>
-        <p:spPr/>
-        <p:txBody>
-          <a:bodyPr/>
-          <a:lstStyle/>
-          <a:p>
-            <a:r>
-              <a:rPr lang="en-US" dirty="0" smtClean="0"/>
-              <a:t>First and foremost: make sure it is clear what data the graph is displaying</a:t>
-            </a:r>
-            <a:r>
-              <a:rPr lang="en-US" dirty="0" smtClean="0"/>
-              <a:t>!</a:t>
+              <a:t>First and foremost: make sure it is clear what data the graph is displaying!</a:t>
             </a:r>
           </a:p>
           <a:p>
@@ -4210,11 +4194,7 @@
           <a:p>
             <a:r>
               <a:rPr lang="en-US" dirty="0" smtClean="0"/>
-              <a:t>Save </a:t>
-            </a:r>
-            <a:r>
-              <a:rPr lang="en-US" dirty="0" smtClean="0"/>
-              <a:t>your image in an appropriate resolution and make sure the image is not cropped</a:t>
+              <a:t>Save your image in an appropriate resolution and make sure the image is not cropped</a:t>
             </a:r>
             <a:r>
               <a:rPr lang="en-US" dirty="0"/>

</xml_diff>